<commit_message>
code for chart output added
</commit_message>
<xml_diff>
--- a/Presentation Slides/Project 2 .pptx
+++ b/Presentation Slides/Project 2 .pptx
@@ -10,6 +10,7 @@
     <p:sldId id="263" r:id="rId7"/>
     <p:sldId id="264" r:id="rId8"/>
     <p:sldId id="265" r:id="rId9"/>
+    <p:sldId id="266" r:id="rId10"/>
   </p:sldIdLst>
   <p:sldSz cx="12192000" cy="6858000"/>
   <p:notesSz cx="6858000" cy="9144000"/>
@@ -585,7 +586,7 @@
           <a:p>
             <a:fld id="{EA0C0817-A112-4847-8014-A94B7D2A4EA3}" type="datetime1">
               <a:rPr lang="en-US" smtClean="0"/>
-              <a:t>6/15/2021</a:t>
+              <a:t>7/17/2021</a:t>
             </a:fld>
             <a:endParaRPr lang="en-US" dirty="0"/>
           </a:p>
@@ -787,7 +788,7 @@
           <a:p>
             <a:fld id="{7332B432-ACDA-4023-A761-2BAB76577B62}" type="datetime1">
               <a:rPr lang="en-US" smtClean="0"/>
-              <a:t>6/15/2021</a:t>
+              <a:t>7/17/2021</a:t>
             </a:fld>
             <a:endParaRPr lang="en-US" dirty="0"/>
           </a:p>
@@ -1386,7 +1387,7 @@
           <a:p>
             <a:fld id="{D9C646AA-F36E-4540-911D-FFFC0A0EF24A}" type="datetime1">
               <a:rPr lang="en-US" smtClean="0"/>
-              <a:t>6/15/2021</a:t>
+              <a:t>7/17/2021</a:t>
             </a:fld>
             <a:endParaRPr lang="en-US" dirty="0"/>
           </a:p>
@@ -1706,7 +1707,7 @@
           <a:p>
             <a:fld id="{69186D26-FA5F-4637-B602-B7C2DC34CFD4}" type="datetime1">
               <a:rPr lang="en-US" smtClean="0"/>
-              <a:t>6/15/2021</a:t>
+              <a:t>7/17/2021</a:t>
             </a:fld>
             <a:endParaRPr lang="en-US" dirty="0"/>
           </a:p>
@@ -2143,7 +2144,7 @@
           <a:p>
             <a:fld id="{8A7F15D8-96D1-4781-BC50-CA8A088B2FE4}" type="datetime1">
               <a:rPr lang="en-US" smtClean="0"/>
-              <a:t>6/15/2021</a:t>
+              <a:t>7/17/2021</a:t>
             </a:fld>
             <a:endParaRPr lang="en-US" dirty="0"/>
           </a:p>
@@ -2261,7 +2262,7 @@
           <a:p>
             <a:fld id="{F9A96C99-B8F8-4528-BD05-0E16E943DC09}" type="datetime1">
               <a:rPr lang="en-US" smtClean="0"/>
-              <a:t>6/15/2021</a:t>
+              <a:t>7/17/2021</a:t>
             </a:fld>
             <a:endParaRPr lang="en-US" dirty="0"/>
           </a:p>
@@ -2356,7 +2357,7 @@
           <a:p>
             <a:fld id="{03636942-C211-4B28-8DBD-C953E00AF71B}" type="datetime1">
               <a:rPr lang="en-US" smtClean="0"/>
-              <a:t>6/15/2021</a:t>
+              <a:t>7/17/2021</a:t>
             </a:fld>
             <a:endParaRPr lang="en-US" dirty="0"/>
           </a:p>
@@ -2773,7 +2774,7 @@
           <a:p>
             <a:fld id="{7E8D12A6-918A-48BD-8CB9-CA713993B0EA}" type="datetime1">
               <a:rPr lang="en-US" smtClean="0"/>
-              <a:t>6/15/2021</a:t>
+              <a:t>7/17/2021</a:t>
             </a:fld>
             <a:endParaRPr lang="en-US" dirty="0"/>
           </a:p>
@@ -3035,7 +3036,7 @@
             <a:fld id="{E778CE86-875F-4587-BCF6-FA054AFC0D53}" type="datetime1">
               <a:rPr lang="en-US" smtClean="0"/>
               <a:pPr/>
-              <a:t>6/15/2021</a:t>
+              <a:t>7/17/2021</a:t>
             </a:fld>
             <a:endParaRPr lang="en-US" dirty="0"/>
           </a:p>
@@ -3551,7 +3552,7 @@
           <a:p>
             <a:fld id="{F6FA2B21-3FCD-4721-B95C-427943F61125}" type="datetime1">
               <a:rPr lang="en-US" smtClean="0"/>
-              <a:t>6/15/2021</a:t>
+              <a:t>7/17/2021</a:t>
             </a:fld>
             <a:endParaRPr lang="en-US" dirty="0"/>
           </a:p>
@@ -5063,6 +5064,89 @@
 </p:sld>
 </file>
 
+<file path=ppt/slides/slide6.xml><?xml version="1.0" encoding="utf-8"?>
+<p:sld xmlns:a="http://schemas.openxmlformats.org/drawingml/2006/main" xmlns:r="http://schemas.openxmlformats.org/officeDocument/2006/relationships" xmlns:p="http://schemas.openxmlformats.org/presentationml/2006/main">
+  <p:cSld>
+    <p:spTree>
+      <p:nvGrpSpPr>
+        <p:cNvPr id="1" name=""/>
+        <p:cNvGrpSpPr/>
+        <p:nvPr/>
+      </p:nvGrpSpPr>
+      <p:grpSpPr>
+        <a:xfrm>
+          <a:off x="0" y="0"/>
+          <a:ext cx="0" cy="0"/>
+          <a:chOff x="0" y="0"/>
+          <a:chExt cx="0" cy="0"/>
+        </a:xfrm>
+      </p:grpSpPr>
+      <p:sp>
+        <p:nvSpPr>
+          <p:cNvPr id="2" name="Title 1">
+            <a:extLst>
+              <a:ext uri="{FF2B5EF4-FFF2-40B4-BE49-F238E27FC236}">
+                <a16:creationId xmlns:a16="http://schemas.microsoft.com/office/drawing/2014/main" id="{9F161683-C90D-41D0-8D91-E8CC0F92B603}"/>
+              </a:ext>
+            </a:extLst>
+          </p:cNvPr>
+          <p:cNvSpPr>
+            <a:spLocks noGrp="1"/>
+          </p:cNvSpPr>
+          <p:nvPr>
+            <p:ph type="title"/>
+          </p:nvPr>
+        </p:nvSpPr>
+        <p:spPr/>
+        <p:txBody>
+          <a:bodyPr/>
+          <a:lstStyle/>
+          <a:p>
+            <a:r>
+              <a:rPr lang="en-US"/>
+              <a:t>Final Project</a:t>
+            </a:r>
+          </a:p>
+        </p:txBody>
+      </p:sp>
+      <p:sp>
+        <p:nvSpPr>
+          <p:cNvPr id="3" name="Text Placeholder 2">
+            <a:extLst>
+              <a:ext uri="{FF2B5EF4-FFF2-40B4-BE49-F238E27FC236}">
+                <a16:creationId xmlns:a16="http://schemas.microsoft.com/office/drawing/2014/main" id="{471F4A22-3F2B-482C-9419-F4C31C5AC051}"/>
+              </a:ext>
+            </a:extLst>
+          </p:cNvPr>
+          <p:cNvSpPr>
+            <a:spLocks noGrp="1"/>
+          </p:cNvSpPr>
+          <p:nvPr>
+            <p:ph type="body" idx="1"/>
+          </p:nvPr>
+        </p:nvSpPr>
+        <p:spPr/>
+        <p:txBody>
+          <a:bodyPr/>
+          <a:lstStyle/>
+          <a:p>
+            <a:endParaRPr lang="en-US"/>
+          </a:p>
+        </p:txBody>
+      </p:sp>
+    </p:spTree>
+    <p:extLst>
+      <p:ext uri="{BB962C8B-B14F-4D97-AF65-F5344CB8AC3E}">
+        <p14:creationId xmlns:p14="http://schemas.microsoft.com/office/powerpoint/2010/main" val="3063722909"/>
+      </p:ext>
+    </p:extLst>
+  </p:cSld>
+  <p:clrMapOvr>
+    <a:masterClrMapping/>
+  </p:clrMapOvr>
+</p:sld>
+</file>
+
 <file path=ppt/theme/theme1.xml><?xml version="1.0" encoding="utf-8"?>
 <a:theme xmlns:a="http://schemas.openxmlformats.org/drawingml/2006/main" name="SavonVTI">
   <a:themeElements>
@@ -5340,12 +5424,12 @@
 </file>
 
 <file path=customXml/item1.xml><?xml version="1.0" encoding="utf-8"?>
-<?mso-contentType ?>
-<FormTemplates xmlns="http://schemas.microsoft.com/sharepoint/v3/contenttype/forms">
-  <Display>DocumentLibraryForm</Display>
-  <Edit>DocumentLibraryForm</Edit>
-  <New>DocumentLibraryForm</New>
-</FormTemplates>
+<p:properties xmlns:p="http://schemas.microsoft.com/office/2006/metadata/properties" xmlns:xsi="http://www.w3.org/2001/XMLSchema-instance" xmlns:pc="http://schemas.microsoft.com/office/infopath/2007/PartnerControls">
+  <documentManagement>
+    <Status xmlns="71af3243-3dd4-4a8d-8c0d-dd76da1f02a5">Not started</Status>
+    <MediaServiceKeyPoints xmlns="71af3243-3dd4-4a8d-8c0d-dd76da1f02a5" xsi:nil="true"/>
+  </documentManagement>
+</p:properties>
 </file>
 
 <file path=customXml/item2.xml><?xml version="1.0" encoding="utf-8"?>
@@ -5570,18 +5654,20 @@
 </file>
 
 <file path=customXml/item3.xml><?xml version="1.0" encoding="utf-8"?>
-<p:properties xmlns:p="http://schemas.microsoft.com/office/2006/metadata/properties" xmlns:xsi="http://www.w3.org/2001/XMLSchema-instance" xmlns:pc="http://schemas.microsoft.com/office/infopath/2007/PartnerControls">
-  <documentManagement>
-    <Status xmlns="71af3243-3dd4-4a8d-8c0d-dd76da1f02a5">Not started</Status>
-    <MediaServiceKeyPoints xmlns="71af3243-3dd4-4a8d-8c0d-dd76da1f02a5" xsi:nil="true"/>
-  </documentManagement>
-</p:properties>
+<?mso-contentType ?>
+<FormTemplates xmlns="http://schemas.microsoft.com/sharepoint/v3/contenttype/forms">
+  <Display>DocumentLibraryForm</Display>
+  <Edit>DocumentLibraryForm</Edit>
+  <New>DocumentLibraryForm</New>
+</FormTemplates>
 </file>
 
 <file path=customXml/itemProps1.xml><?xml version="1.0" encoding="utf-8"?>
-<ds:datastoreItem xmlns:ds="http://schemas.openxmlformats.org/officeDocument/2006/customXml" ds:itemID="{CDB58277-F8DF-46FF-84EC-EF41B835E69F}">
+<ds:datastoreItem xmlns:ds="http://schemas.openxmlformats.org/officeDocument/2006/customXml" ds:itemID="{137651BA-F45C-4845-9AB3-E0A65B39F5E1}">
   <ds:schemaRefs>
-    <ds:schemaRef ds:uri="http://schemas.microsoft.com/sharepoint/v3/contenttype/forms"/>
+    <ds:schemaRef ds:uri="http://schemas.microsoft.com/office/2006/metadata/properties"/>
+    <ds:schemaRef ds:uri="http://schemas.microsoft.com/office/infopath/2007/PartnerControls"/>
+    <ds:schemaRef ds:uri="71af3243-3dd4-4a8d-8c0d-dd76da1f02a5"/>
   </ds:schemaRefs>
 </ds:datastoreItem>
 </file>
@@ -5606,11 +5692,9 @@
 </file>
 
 <file path=customXml/itemProps3.xml><?xml version="1.0" encoding="utf-8"?>
-<ds:datastoreItem xmlns:ds="http://schemas.openxmlformats.org/officeDocument/2006/customXml" ds:itemID="{137651BA-F45C-4845-9AB3-E0A65B39F5E1}">
+<ds:datastoreItem xmlns:ds="http://schemas.openxmlformats.org/officeDocument/2006/customXml" ds:itemID="{CDB58277-F8DF-46FF-84EC-EF41B835E69F}">
   <ds:schemaRefs>
-    <ds:schemaRef ds:uri="http://schemas.microsoft.com/office/2006/metadata/properties"/>
-    <ds:schemaRef ds:uri="http://schemas.microsoft.com/office/infopath/2007/PartnerControls"/>
-    <ds:schemaRef ds:uri="71af3243-3dd4-4a8d-8c0d-dd76da1f02a5"/>
+    <ds:schemaRef ds:uri="http://schemas.microsoft.com/sharepoint/v3/contenttype/forms"/>
   </ds:schemaRefs>
 </ds:datastoreItem>
 </file>
</xml_diff>